<commit_message>
nusmv: small improvements of the importer - migrations applied and improved modularization
</commit_message>
<xml_diff>
--- a/docs/figures/figures.pptx
+++ b/docs/figures/figures.pptx
@@ -5,8 +5,10 @@
     <p:sldMasterId id="2147483648" r:id="rId1"/>
   </p:sldMasterIdLst>
   <p:sldIdLst>
-    <p:sldId id="256" r:id="rId2"/>
-    <p:sldId id="257" r:id="rId3"/>
+    <p:sldId id="257" r:id="rId2"/>
+    <p:sldId id="258" r:id="rId3"/>
+    <p:sldId id="259" r:id="rId4"/>
+    <p:sldId id="260" r:id="rId5"/>
   </p:sldIdLst>
   <p:sldSz cx="9144000" cy="6858000" type="screen4x3"/>
   <p:notesSz cx="6858000" cy="9144000"/>
@@ -3062,138 +3064,6 @@
       </p:grpSpPr>
       <p:pic>
         <p:nvPicPr>
-          <p:cNvPr id="1026" name="Picture 2"/>
-          <p:cNvPicPr>
-            <a:picLocks noChangeAspect="1" noChangeArrowheads="1"/>
-          </p:cNvPicPr>
-          <p:nvPr/>
-        </p:nvPicPr>
-        <p:blipFill>
-          <a:blip r:embed="rId2" cstate="print"/>
-          <a:srcRect/>
-          <a:stretch>
-            <a:fillRect/>
-          </a:stretch>
-        </p:blipFill>
-        <p:spPr bwMode="auto">
-          <a:xfrm>
-            <a:off x="0" y="0"/>
-            <a:ext cx="12192000" cy="6858000"/>
-          </a:xfrm>
-          <a:prstGeom prst="rect">
-            <a:avLst/>
-          </a:prstGeom>
-          <a:noFill/>
-          <a:ln w="9525">
-            <a:noFill/>
-            <a:miter lim="800000"/>
-            <a:headEnd/>
-            <a:tailEnd/>
-          </a:ln>
-        </p:spPr>
-      </p:pic>
-      <p:sp>
-        <p:nvSpPr>
-          <p:cNvPr id="5" name="Textfeld 4"/>
-          <p:cNvSpPr txBox="1"/>
-          <p:nvPr/>
-        </p:nvSpPr>
-        <p:spPr>
-          <a:xfrm>
-            <a:off x="1948044" y="2276872"/>
-            <a:ext cx="535724" cy="253916"/>
-          </a:xfrm>
-          <a:prstGeom prst="rect">
-            <a:avLst/>
-          </a:prstGeom>
-          <a:solidFill>
-            <a:schemeClr val="accent6">
-              <a:lumMod val="20000"/>
-              <a:lumOff val="80000"/>
-              <a:alpha val="76000"/>
-            </a:schemeClr>
-          </a:solidFill>
-        </p:spPr>
-        <p:txBody>
-          <a:bodyPr wrap="none" rtlCol="0">
-            <a:spAutoFit/>
-          </a:bodyPr>
-          <a:lstStyle/>
-          <a:p>
-            <a:r>
-              <a:rPr lang="en-US" sz="1050" b="1" dirty="0" smtClean="0">
-                <a:solidFill>
-                  <a:srgbClr val="C00000"/>
-                </a:solidFill>
-              </a:rPr>
-              <a:t>inputs</a:t>
-            </a:r>
-          </a:p>
-        </p:txBody>
-      </p:sp>
-      <p:cxnSp>
-        <p:nvCxnSpPr>
-          <p:cNvPr id="6" name="Gerade Verbindung mit Pfeil 5"/>
-          <p:cNvCxnSpPr/>
-          <p:nvPr/>
-        </p:nvCxnSpPr>
-        <p:spPr>
-          <a:xfrm>
-            <a:off x="2483768" y="2420888"/>
-            <a:ext cx="576064" cy="144016"/>
-          </a:xfrm>
-          <a:prstGeom prst="straightConnector1">
-            <a:avLst/>
-          </a:prstGeom>
-          <a:ln w="19050">
-            <a:solidFill>
-              <a:srgbClr val="C00000"/>
-            </a:solidFill>
-            <a:tailEnd type="triangle"/>
-          </a:ln>
-        </p:spPr>
-        <p:style>
-          <a:lnRef idx="1">
-            <a:schemeClr val="accent1"/>
-          </a:lnRef>
-          <a:fillRef idx="0">
-            <a:schemeClr val="accent1"/>
-          </a:fillRef>
-          <a:effectRef idx="0">
-            <a:schemeClr val="accent1"/>
-          </a:effectRef>
-          <a:fontRef idx="minor">
-            <a:schemeClr val="tx1"/>
-          </a:fontRef>
-        </p:style>
-      </p:cxnSp>
-    </p:spTree>
-  </p:cSld>
-  <p:clrMapOvr>
-    <a:masterClrMapping/>
-  </p:clrMapOvr>
-</p:sld>
-</file>
-
-<file path=ppt/slides/slide2.xml><?xml version="1.0" encoding="utf-8"?>
-<p:sld xmlns:a="http://schemas.openxmlformats.org/drawingml/2006/main" xmlns:r="http://schemas.openxmlformats.org/officeDocument/2006/relationships" xmlns:p="http://schemas.openxmlformats.org/presentationml/2006/main">
-  <p:cSld>
-    <p:spTree>
-      <p:nvGrpSpPr>
-        <p:cNvPr id="1" name=""/>
-        <p:cNvGrpSpPr/>
-        <p:nvPr/>
-      </p:nvGrpSpPr>
-      <p:grpSpPr>
-        <a:xfrm>
-          <a:off x="0" y="0"/>
-          <a:ext cx="0" cy="0"/>
-          <a:chOff x="0" y="0"/>
-          <a:chExt cx="0" cy="0"/>
-        </a:xfrm>
-      </p:grpSpPr>
-      <p:pic>
-        <p:nvPicPr>
           <p:cNvPr id="2050" name="Picture 2"/>
           <p:cNvPicPr>
             <a:picLocks noChangeAspect="1" noChangeArrowheads="1"/>
@@ -3571,6 +3441,1297 @@
                 </a:solidFill>
               </a:rPr>
               <a:t>he command used to run it.</a:t>
+            </a:r>
+            <a:endParaRPr lang="en-US" sz="1050" b="1" dirty="0" smtClean="0">
+              <a:solidFill>
+                <a:srgbClr val="C00000"/>
+              </a:solidFill>
+            </a:endParaRPr>
+          </a:p>
+        </p:txBody>
+      </p:sp>
+    </p:spTree>
+  </p:cSld>
+  <p:clrMapOvr>
+    <a:masterClrMapping/>
+  </p:clrMapOvr>
+</p:sld>
+</file>
+
+<file path=ppt/slides/slide2.xml><?xml version="1.0" encoding="utf-8"?>
+<p:sld xmlns:a="http://schemas.openxmlformats.org/drawingml/2006/main" xmlns:r="http://schemas.openxmlformats.org/officeDocument/2006/relationships" xmlns:p="http://schemas.openxmlformats.org/presentationml/2006/main">
+  <p:cSld>
+    <p:spTree>
+      <p:nvGrpSpPr>
+        <p:cNvPr id="1" name=""/>
+        <p:cNvGrpSpPr/>
+        <p:nvPr/>
+      </p:nvGrpSpPr>
+      <p:grpSpPr>
+        <a:xfrm>
+          <a:off x="0" y="0"/>
+          <a:ext cx="0" cy="0"/>
+          <a:chOff x="0" y="0"/>
+          <a:chExt cx="0" cy="0"/>
+        </a:xfrm>
+      </p:grpSpPr>
+      <p:pic>
+        <p:nvPicPr>
+          <p:cNvPr id="3075" name="Picture 3"/>
+          <p:cNvPicPr>
+            <a:picLocks noChangeAspect="1" noChangeArrowheads="1"/>
+          </p:cNvPicPr>
+          <p:nvPr/>
+        </p:nvPicPr>
+        <p:blipFill>
+          <a:blip r:embed="rId2" cstate="print"/>
+          <a:srcRect t="2100" r="26764" b="32801"/>
+          <a:stretch>
+            <a:fillRect/>
+          </a:stretch>
+        </p:blipFill>
+        <p:spPr bwMode="auto">
+          <a:xfrm>
+            <a:off x="35496" y="188640"/>
+            <a:ext cx="8928992" cy="4464496"/>
+          </a:xfrm>
+          <a:prstGeom prst="rect">
+            <a:avLst/>
+          </a:prstGeom>
+          <a:noFill/>
+          <a:ln w="9525">
+            <a:noFill/>
+            <a:miter lim="800000"/>
+            <a:headEnd/>
+            <a:tailEnd/>
+          </a:ln>
+        </p:spPr>
+      </p:pic>
+      <p:grpSp>
+        <p:nvGrpSpPr>
+          <p:cNvPr id="6" name="Gruppieren 5"/>
+          <p:cNvGrpSpPr/>
+          <p:nvPr/>
+        </p:nvGrpSpPr>
+        <p:grpSpPr>
+          <a:xfrm>
+            <a:off x="4644008" y="4399220"/>
+            <a:ext cx="1368152" cy="253916"/>
+            <a:chOff x="-716252" y="2599020"/>
+            <a:chExt cx="1368152" cy="253916"/>
+          </a:xfrm>
+        </p:grpSpPr>
+        <p:sp>
+          <p:nvSpPr>
+            <p:cNvPr id="7" name="Textfeld 6"/>
+            <p:cNvSpPr txBox="1"/>
+            <p:nvPr/>
+          </p:nvSpPr>
+          <p:spPr>
+            <a:xfrm>
+              <a:off x="-716252" y="2599020"/>
+              <a:ext cx="920445" cy="253916"/>
+            </a:xfrm>
+            <a:prstGeom prst="rect">
+              <a:avLst/>
+            </a:prstGeom>
+            <a:solidFill>
+              <a:schemeClr val="accent6">
+                <a:lumMod val="20000"/>
+                <a:lumOff val="80000"/>
+                <a:alpha val="76000"/>
+              </a:schemeClr>
+            </a:solidFill>
+          </p:spPr>
+          <p:txBody>
+            <a:bodyPr wrap="none" rtlCol="0">
+              <a:spAutoFit/>
+            </a:bodyPr>
+            <a:lstStyle/>
+            <a:p>
+              <a:r>
+                <a:rPr lang="en-US" sz="1050" b="1" dirty="0" smtClean="0">
+                  <a:solidFill>
+                    <a:srgbClr val="C00000"/>
+                  </a:solidFill>
+                </a:rPr>
+                <a:t>Run the tests</a:t>
+              </a:r>
+              <a:endParaRPr lang="en-US" sz="1050" b="1" dirty="0" smtClean="0">
+                <a:solidFill>
+                  <a:srgbClr val="C00000"/>
+                </a:solidFill>
+              </a:endParaRPr>
+            </a:p>
+          </p:txBody>
+        </p:sp>
+        <p:cxnSp>
+          <p:nvCxnSpPr>
+            <p:cNvPr id="8" name="Gerade Verbindung mit Pfeil 7"/>
+            <p:cNvCxnSpPr>
+              <a:stCxn id="7" idx="3"/>
+            </p:cNvCxnSpPr>
+            <p:nvPr/>
+          </p:nvCxnSpPr>
+          <p:spPr>
+            <a:xfrm flipV="1">
+              <a:off x="204193" y="2708920"/>
+              <a:ext cx="447707" cy="17058"/>
+            </a:xfrm>
+            <a:prstGeom prst="straightConnector1">
+              <a:avLst/>
+            </a:prstGeom>
+            <a:ln w="19050">
+              <a:solidFill>
+                <a:srgbClr val="C00000"/>
+              </a:solidFill>
+              <a:tailEnd type="triangle"/>
+            </a:ln>
+          </p:spPr>
+          <p:style>
+            <a:lnRef idx="1">
+              <a:schemeClr val="accent1"/>
+            </a:lnRef>
+            <a:fillRef idx="0">
+              <a:schemeClr val="accent1"/>
+            </a:fillRef>
+            <a:effectRef idx="0">
+              <a:schemeClr val="accent1"/>
+            </a:effectRef>
+            <a:fontRef idx="minor">
+              <a:schemeClr val="tx1"/>
+            </a:fontRef>
+          </p:style>
+        </p:cxnSp>
+      </p:grpSp>
+      <p:sp>
+        <p:nvSpPr>
+          <p:cNvPr id="11" name="Textfeld 10"/>
+          <p:cNvSpPr txBox="1"/>
+          <p:nvPr/>
+        </p:nvSpPr>
+        <p:spPr>
+          <a:xfrm>
+            <a:off x="1851101" y="1844824"/>
+            <a:ext cx="1293944" cy="415498"/>
+          </a:xfrm>
+          <a:prstGeom prst="rect">
+            <a:avLst/>
+          </a:prstGeom>
+          <a:solidFill>
+            <a:schemeClr val="accent6">
+              <a:lumMod val="20000"/>
+              <a:lumOff val="80000"/>
+              <a:alpha val="76000"/>
+            </a:schemeClr>
+          </a:solidFill>
+        </p:spPr>
+        <p:txBody>
+          <a:bodyPr wrap="none" rtlCol="0">
+            <a:spAutoFit/>
+          </a:bodyPr>
+          <a:lstStyle/>
+          <a:p>
+            <a:r>
+              <a:rPr lang="en-US" sz="1050" b="1" dirty="0" smtClean="0">
+                <a:solidFill>
+                  <a:srgbClr val="C00000"/>
+                </a:solidFill>
+              </a:rPr>
+              <a:t>Two test c</a:t>
+            </a:r>
+            <a:r>
+              <a:rPr lang="en-US" sz="1050" b="1" dirty="0" smtClean="0">
+                <a:solidFill>
+                  <a:srgbClr val="C00000"/>
+                </a:solidFill>
+              </a:rPr>
+              <a:t>ases, </a:t>
+            </a:r>
+          </a:p>
+          <a:p>
+            <a:r>
+              <a:rPr lang="en-US" sz="1050" b="1" dirty="0" smtClean="0">
+                <a:solidFill>
+                  <a:srgbClr val="C00000"/>
+                </a:solidFill>
+              </a:rPr>
+              <a:t>each with five steps</a:t>
+            </a:r>
+            <a:endParaRPr lang="en-US" sz="1050" b="1" dirty="0" smtClean="0">
+              <a:solidFill>
+                <a:srgbClr val="C00000"/>
+              </a:solidFill>
+            </a:endParaRPr>
+          </a:p>
+        </p:txBody>
+      </p:sp>
+      <p:sp>
+        <p:nvSpPr>
+          <p:cNvPr id="14" name="Geschweifte Klammer links 13"/>
+          <p:cNvSpPr/>
+          <p:nvPr/>
+        </p:nvSpPr>
+        <p:spPr>
+          <a:xfrm>
+            <a:off x="3131840" y="980728"/>
+            <a:ext cx="216024" cy="2160240"/>
+          </a:xfrm>
+          <a:prstGeom prst="leftBrace">
+            <a:avLst/>
+          </a:prstGeom>
+          <a:ln w="19050">
+            <a:solidFill>
+              <a:srgbClr val="C00000"/>
+            </a:solidFill>
+            <a:tailEnd type="none"/>
+          </a:ln>
+        </p:spPr>
+        <p:style>
+          <a:lnRef idx="1">
+            <a:schemeClr val="accent1"/>
+          </a:lnRef>
+          <a:fillRef idx="0">
+            <a:schemeClr val="accent1"/>
+          </a:fillRef>
+          <a:effectRef idx="0">
+            <a:schemeClr val="accent1"/>
+          </a:effectRef>
+          <a:fontRef idx="minor">
+            <a:schemeClr val="tx1"/>
+          </a:fontRef>
+        </p:style>
+        <p:txBody>
+          <a:bodyPr rtlCol="0" anchor="ctr"/>
+          <a:lstStyle/>
+          <a:p>
+            <a:pPr algn="ctr"/>
+            <a:endParaRPr lang="en-US"/>
+          </a:p>
+        </p:txBody>
+      </p:sp>
+      <p:sp>
+        <p:nvSpPr>
+          <p:cNvPr id="16" name="Textfeld 15"/>
+          <p:cNvSpPr txBox="1"/>
+          <p:nvPr/>
+        </p:nvSpPr>
+        <p:spPr>
+          <a:xfrm>
+            <a:off x="755576" y="3429000"/>
+            <a:ext cx="1197764" cy="253916"/>
+          </a:xfrm>
+          <a:prstGeom prst="rect">
+            <a:avLst/>
+          </a:prstGeom>
+          <a:solidFill>
+            <a:schemeClr val="accent6">
+              <a:lumMod val="20000"/>
+              <a:lumOff val="80000"/>
+              <a:alpha val="76000"/>
+            </a:schemeClr>
+          </a:solidFill>
+        </p:spPr>
+        <p:txBody>
+          <a:bodyPr wrap="none" rtlCol="0">
+            <a:spAutoFit/>
+          </a:bodyPr>
+          <a:lstStyle/>
+          <a:p>
+            <a:r>
+              <a:rPr lang="en-US" sz="1050" b="1" dirty="0" smtClean="0">
+                <a:solidFill>
+                  <a:srgbClr val="C00000"/>
+                </a:solidFill>
+              </a:rPr>
+              <a:t>System under test</a:t>
+            </a:r>
+            <a:endParaRPr lang="en-US" sz="1050" b="1" dirty="0" smtClean="0">
+              <a:solidFill>
+                <a:srgbClr val="C00000"/>
+              </a:solidFill>
+            </a:endParaRPr>
+          </a:p>
+        </p:txBody>
+      </p:sp>
+      <p:cxnSp>
+        <p:nvCxnSpPr>
+          <p:cNvPr id="19" name="Gerade Verbindung mit Pfeil 18"/>
+          <p:cNvCxnSpPr>
+            <a:stCxn id="16" idx="0"/>
+          </p:cNvCxnSpPr>
+          <p:nvPr/>
+        </p:nvCxnSpPr>
+        <p:spPr>
+          <a:xfrm flipV="1">
+            <a:off x="1354458" y="2924944"/>
+            <a:ext cx="49190" cy="504056"/>
+          </a:xfrm>
+          <a:prstGeom prst="straightConnector1">
+            <a:avLst/>
+          </a:prstGeom>
+          <a:ln w="19050">
+            <a:solidFill>
+              <a:srgbClr val="C00000"/>
+            </a:solidFill>
+            <a:tailEnd type="triangle"/>
+          </a:ln>
+        </p:spPr>
+        <p:style>
+          <a:lnRef idx="1">
+            <a:schemeClr val="accent1"/>
+          </a:lnRef>
+          <a:fillRef idx="0">
+            <a:schemeClr val="accent1"/>
+          </a:fillRef>
+          <a:effectRef idx="0">
+            <a:schemeClr val="accent1"/>
+          </a:effectRef>
+          <a:fontRef idx="minor">
+            <a:schemeClr val="tx1"/>
+          </a:fontRef>
+        </p:style>
+      </p:cxnSp>
+      <p:grpSp>
+        <p:nvGrpSpPr>
+          <p:cNvPr id="22" name="Gruppieren 21"/>
+          <p:cNvGrpSpPr/>
+          <p:nvPr/>
+        </p:nvGrpSpPr>
+        <p:grpSpPr>
+          <a:xfrm>
+            <a:off x="4139952" y="3212976"/>
+            <a:ext cx="1721946" cy="783922"/>
+            <a:chOff x="-1292316" y="2158588"/>
+            <a:chExt cx="1721946" cy="783922"/>
+          </a:xfrm>
+        </p:grpSpPr>
+        <p:sp>
+          <p:nvSpPr>
+            <p:cNvPr id="23" name="Textfeld 22"/>
+            <p:cNvSpPr txBox="1"/>
+            <p:nvPr/>
+          </p:nvSpPr>
+          <p:spPr>
+            <a:xfrm>
+              <a:off x="-1292316" y="2527012"/>
+              <a:ext cx="1721946" cy="415498"/>
+            </a:xfrm>
+            <a:prstGeom prst="rect">
+              <a:avLst/>
+            </a:prstGeom>
+            <a:solidFill>
+              <a:schemeClr val="accent6">
+                <a:lumMod val="20000"/>
+                <a:lumOff val="80000"/>
+                <a:alpha val="76000"/>
+              </a:schemeClr>
+            </a:solidFill>
+          </p:spPr>
+          <p:txBody>
+            <a:bodyPr wrap="none" rtlCol="0">
+              <a:spAutoFit/>
+            </a:bodyPr>
+            <a:lstStyle/>
+            <a:p>
+              <a:r>
+                <a:rPr lang="en-US" sz="1050" b="1" dirty="0" smtClean="0">
+                  <a:solidFill>
+                    <a:srgbClr val="C00000"/>
+                  </a:solidFill>
+                </a:rPr>
+                <a:t>Test results are marked </a:t>
+              </a:r>
+            </a:p>
+            <a:p>
+              <a:r>
+                <a:rPr lang="en-US" sz="1050" b="1" dirty="0" smtClean="0">
+                  <a:solidFill>
+                    <a:srgbClr val="C00000"/>
+                  </a:solidFill>
+                </a:rPr>
+                <a:t>w</a:t>
+              </a:r>
+              <a:r>
+                <a:rPr lang="en-US" sz="1050" b="1" dirty="0" smtClean="0">
+                  <a:solidFill>
+                    <a:srgbClr val="C00000"/>
+                  </a:solidFill>
+                </a:rPr>
+                <a:t>ith green/r</a:t>
+              </a:r>
+              <a:r>
+                <a:rPr lang="en-US" sz="1050" b="1" dirty="0" smtClean="0">
+                  <a:solidFill>
+                    <a:srgbClr val="C00000"/>
+                  </a:solidFill>
+                </a:rPr>
+                <a:t>ed background</a:t>
+              </a:r>
+              <a:endParaRPr lang="en-US" sz="1050" b="1" dirty="0" smtClean="0">
+                <a:solidFill>
+                  <a:srgbClr val="C00000"/>
+                </a:solidFill>
+              </a:endParaRPr>
+            </a:p>
+          </p:txBody>
+        </p:sp>
+        <p:cxnSp>
+          <p:nvCxnSpPr>
+            <p:cNvPr id="24" name="Gerade Verbindung mit Pfeil 23"/>
+            <p:cNvCxnSpPr>
+              <a:stCxn id="23" idx="0"/>
+            </p:cNvCxnSpPr>
+            <p:nvPr/>
+          </p:nvCxnSpPr>
+          <p:spPr>
+            <a:xfrm flipV="1">
+              <a:off x="-431343" y="2158588"/>
+              <a:ext cx="363163" cy="368424"/>
+            </a:xfrm>
+            <a:prstGeom prst="straightConnector1">
+              <a:avLst/>
+            </a:prstGeom>
+            <a:ln w="19050">
+              <a:solidFill>
+                <a:srgbClr val="C00000"/>
+              </a:solidFill>
+              <a:tailEnd type="triangle"/>
+            </a:ln>
+          </p:spPr>
+          <p:style>
+            <a:lnRef idx="1">
+              <a:schemeClr val="accent1"/>
+            </a:lnRef>
+            <a:fillRef idx="0">
+              <a:schemeClr val="accent1"/>
+            </a:fillRef>
+            <a:effectRef idx="0">
+              <a:schemeClr val="accent1"/>
+            </a:effectRef>
+            <a:fontRef idx="minor">
+              <a:schemeClr val="tx1"/>
+            </a:fontRef>
+          </p:style>
+        </p:cxnSp>
+      </p:grpSp>
+      <p:grpSp>
+        <p:nvGrpSpPr>
+          <p:cNvPr id="28" name="Gruppieren 27"/>
+          <p:cNvGrpSpPr/>
+          <p:nvPr/>
+        </p:nvGrpSpPr>
+        <p:grpSpPr>
+          <a:xfrm>
+            <a:off x="4932042" y="332656"/>
+            <a:ext cx="3604583" cy="288032"/>
+            <a:chOff x="-1220306" y="2599020"/>
+            <a:chExt cx="3604583" cy="288032"/>
+          </a:xfrm>
+        </p:grpSpPr>
+        <p:sp>
+          <p:nvSpPr>
+            <p:cNvPr id="29" name="Textfeld 28"/>
+            <p:cNvSpPr txBox="1"/>
+            <p:nvPr/>
+          </p:nvSpPr>
+          <p:spPr>
+            <a:xfrm>
+              <a:off x="-716252" y="2599020"/>
+              <a:ext cx="3100529" cy="253916"/>
+            </a:xfrm>
+            <a:prstGeom prst="rect">
+              <a:avLst/>
+            </a:prstGeom>
+            <a:solidFill>
+              <a:schemeClr val="accent6">
+                <a:lumMod val="20000"/>
+                <a:lumOff val="80000"/>
+                <a:alpha val="76000"/>
+              </a:schemeClr>
+            </a:solidFill>
+          </p:spPr>
+          <p:txBody>
+            <a:bodyPr wrap="none" rtlCol="0">
+              <a:spAutoFit/>
+            </a:bodyPr>
+            <a:lstStyle/>
+            <a:p>
+              <a:r>
+                <a:rPr lang="en-US" sz="1050" b="1" dirty="0" smtClean="0">
+                  <a:solidFill>
+                    <a:srgbClr val="C00000"/>
+                  </a:solidFill>
+                </a:rPr>
+                <a:t>Right-click on a test collection opens a pop-up menu</a:t>
+              </a:r>
+              <a:endParaRPr lang="en-US" sz="1050" b="1" dirty="0" smtClean="0">
+                <a:solidFill>
+                  <a:srgbClr val="C00000"/>
+                </a:solidFill>
+              </a:endParaRPr>
+            </a:p>
+          </p:txBody>
+        </p:sp>
+        <p:cxnSp>
+          <p:nvCxnSpPr>
+            <p:cNvPr id="30" name="Gerade Verbindung mit Pfeil 29"/>
+            <p:cNvCxnSpPr>
+              <a:stCxn id="29" idx="1"/>
+            </p:cNvCxnSpPr>
+            <p:nvPr/>
+          </p:nvCxnSpPr>
+          <p:spPr>
+            <a:xfrm flipH="1">
+              <a:off x="-1220306" y="2725978"/>
+              <a:ext cx="504054" cy="161074"/>
+            </a:xfrm>
+            <a:prstGeom prst="straightConnector1">
+              <a:avLst/>
+            </a:prstGeom>
+            <a:ln w="19050">
+              <a:solidFill>
+                <a:srgbClr val="C00000"/>
+              </a:solidFill>
+              <a:tailEnd type="triangle"/>
+            </a:ln>
+          </p:spPr>
+          <p:style>
+            <a:lnRef idx="1">
+              <a:schemeClr val="accent1"/>
+            </a:lnRef>
+            <a:fillRef idx="0">
+              <a:schemeClr val="accent1"/>
+            </a:fillRef>
+            <a:effectRef idx="0">
+              <a:schemeClr val="accent1"/>
+            </a:effectRef>
+            <a:fontRef idx="minor">
+              <a:schemeClr val="tx1"/>
+            </a:fontRef>
+          </p:style>
+        </p:cxnSp>
+      </p:grpSp>
+    </p:spTree>
+  </p:cSld>
+  <p:clrMapOvr>
+    <a:masterClrMapping/>
+  </p:clrMapOvr>
+</p:sld>
+</file>
+
+<file path=ppt/slides/slide3.xml><?xml version="1.0" encoding="utf-8"?>
+<p:sld xmlns:a="http://schemas.openxmlformats.org/drawingml/2006/main" xmlns:r="http://schemas.openxmlformats.org/officeDocument/2006/relationships" xmlns:p="http://schemas.openxmlformats.org/presentationml/2006/main">
+  <p:cSld>
+    <p:spTree>
+      <p:nvGrpSpPr>
+        <p:cNvPr id="1" name=""/>
+        <p:cNvGrpSpPr/>
+        <p:nvPr/>
+      </p:nvGrpSpPr>
+      <p:grpSpPr>
+        <a:xfrm>
+          <a:off x="0" y="0"/>
+          <a:ext cx="0" cy="0"/>
+          <a:chOff x="0" y="0"/>
+          <a:chExt cx="0" cy="0"/>
+        </a:xfrm>
+      </p:grpSpPr>
+      <p:pic>
+        <p:nvPicPr>
+          <p:cNvPr id="4102" name="Picture 6"/>
+          <p:cNvPicPr>
+            <a:picLocks noChangeAspect="1" noChangeArrowheads="1"/>
+          </p:cNvPicPr>
+          <p:nvPr/>
+        </p:nvPicPr>
+        <p:blipFill>
+          <a:blip r:embed="rId2" cstate="print"/>
+          <a:srcRect/>
+          <a:stretch>
+            <a:fillRect/>
+          </a:stretch>
+        </p:blipFill>
+        <p:spPr bwMode="auto">
+          <a:xfrm>
+            <a:off x="4932040" y="116632"/>
+            <a:ext cx="2611612" cy="3220988"/>
+          </a:xfrm>
+          <a:prstGeom prst="rect">
+            <a:avLst/>
+          </a:prstGeom>
+          <a:noFill/>
+          <a:ln w="9525">
+            <a:noFill/>
+            <a:miter lim="800000"/>
+            <a:headEnd/>
+            <a:tailEnd/>
+          </a:ln>
+        </p:spPr>
+      </p:pic>
+      <p:pic>
+        <p:nvPicPr>
+          <p:cNvPr id="4098" name="Picture 2"/>
+          <p:cNvPicPr>
+            <a:picLocks noChangeAspect="1" noChangeArrowheads="1"/>
+          </p:cNvPicPr>
+          <p:nvPr/>
+        </p:nvPicPr>
+        <p:blipFill>
+          <a:blip r:embed="rId3" cstate="print"/>
+          <a:srcRect t="1701" r="76675" b="46850"/>
+          <a:stretch>
+            <a:fillRect/>
+          </a:stretch>
+        </p:blipFill>
+        <p:spPr bwMode="auto">
+          <a:xfrm>
+            <a:off x="72008" y="116632"/>
+            <a:ext cx="2843808" cy="3528392"/>
+          </a:xfrm>
+          <a:prstGeom prst="rect">
+            <a:avLst/>
+          </a:prstGeom>
+          <a:noFill/>
+          <a:ln w="9525">
+            <a:noFill/>
+            <a:miter lim="800000"/>
+            <a:headEnd/>
+            <a:tailEnd/>
+          </a:ln>
+        </p:spPr>
+      </p:pic>
+      <p:sp>
+        <p:nvSpPr>
+          <p:cNvPr id="6" name="Pfeil nach rechts 5"/>
+          <p:cNvSpPr/>
+          <p:nvPr/>
+        </p:nvSpPr>
+        <p:spPr>
+          <a:xfrm>
+            <a:off x="4139952" y="1772816"/>
+            <a:ext cx="576064" cy="360040"/>
+          </a:xfrm>
+          <a:prstGeom prst="rightArrow">
+            <a:avLst/>
+          </a:prstGeom>
+        </p:spPr>
+        <p:style>
+          <a:lnRef idx="2">
+            <a:schemeClr val="accent1">
+              <a:shade val="50000"/>
+            </a:schemeClr>
+          </a:lnRef>
+          <a:fillRef idx="1">
+            <a:schemeClr val="accent1"/>
+          </a:fillRef>
+          <a:effectRef idx="0">
+            <a:schemeClr val="accent1"/>
+          </a:effectRef>
+          <a:fontRef idx="minor">
+            <a:schemeClr val="lt1"/>
+          </a:fontRef>
+        </p:style>
+        <p:txBody>
+          <a:bodyPr rtlCol="0" anchor="ctr"/>
+          <a:lstStyle/>
+          <a:p>
+            <a:pPr algn="ctr"/>
+            <a:endParaRPr lang="en-US"/>
+          </a:p>
+        </p:txBody>
+      </p:sp>
+      <p:sp>
+        <p:nvSpPr>
+          <p:cNvPr id="7" name="Textfeld 6"/>
+          <p:cNvSpPr txBox="1"/>
+          <p:nvPr/>
+        </p:nvSpPr>
+        <p:spPr>
+          <a:xfrm>
+            <a:off x="2051720" y="2780928"/>
+            <a:ext cx="2016224" cy="415498"/>
+          </a:xfrm>
+          <a:prstGeom prst="rect">
+            <a:avLst/>
+          </a:prstGeom>
+          <a:solidFill>
+            <a:schemeClr val="accent6">
+              <a:lumMod val="20000"/>
+              <a:lumOff val="80000"/>
+              <a:alpha val="76000"/>
+            </a:schemeClr>
+          </a:solidFill>
+        </p:spPr>
+        <p:txBody>
+          <a:bodyPr wrap="square" rtlCol="0">
+            <a:spAutoFit/>
+          </a:bodyPr>
+          <a:lstStyle/>
+          <a:p>
+            <a:r>
+              <a:rPr lang="en-US" sz="1050" b="1" dirty="0" smtClean="0">
+                <a:solidFill>
+                  <a:srgbClr val="C00000"/>
+                </a:solidFill>
+              </a:rPr>
+              <a:t>Architecture definition inside of</a:t>
+            </a:r>
+          </a:p>
+          <a:p>
+            <a:r>
+              <a:rPr lang="en-US" sz="1050" b="1" dirty="0" smtClean="0">
+                <a:solidFill>
+                  <a:srgbClr val="C00000"/>
+                </a:solidFill>
+              </a:rPr>
+              <a:t>a</a:t>
+            </a:r>
+            <a:r>
+              <a:rPr lang="en-US" sz="1050" b="1" dirty="0" smtClean="0">
+                <a:solidFill>
+                  <a:srgbClr val="C00000"/>
+                </a:solidFill>
+              </a:rPr>
+              <a:t> WIRING section of a module</a:t>
+            </a:r>
+            <a:endParaRPr lang="en-US" sz="1050" b="1" dirty="0" smtClean="0">
+              <a:solidFill>
+                <a:srgbClr val="C00000"/>
+              </a:solidFill>
+            </a:endParaRPr>
+          </a:p>
+        </p:txBody>
+      </p:sp>
+      <p:cxnSp>
+        <p:nvCxnSpPr>
+          <p:cNvPr id="8" name="Gerade Verbindung mit Pfeil 7"/>
+          <p:cNvCxnSpPr>
+            <a:stCxn id="7" idx="1"/>
+          </p:cNvCxnSpPr>
+          <p:nvPr/>
+        </p:nvCxnSpPr>
+        <p:spPr>
+          <a:xfrm flipH="1">
+            <a:off x="1259632" y="2988677"/>
+            <a:ext cx="792088" cy="8275"/>
+          </a:xfrm>
+          <a:prstGeom prst="straightConnector1">
+            <a:avLst/>
+          </a:prstGeom>
+          <a:ln w="19050">
+            <a:solidFill>
+              <a:srgbClr val="C00000"/>
+            </a:solidFill>
+            <a:tailEnd type="triangle"/>
+          </a:ln>
+        </p:spPr>
+        <p:style>
+          <a:lnRef idx="1">
+            <a:schemeClr val="accent1"/>
+          </a:lnRef>
+          <a:fillRef idx="0">
+            <a:schemeClr val="accent1"/>
+          </a:fillRef>
+          <a:effectRef idx="0">
+            <a:schemeClr val="accent1"/>
+          </a:effectRef>
+          <a:fontRef idx="minor">
+            <a:schemeClr val="tx1"/>
+          </a:fontRef>
+        </p:style>
+      </p:cxnSp>
+      <p:sp>
+        <p:nvSpPr>
+          <p:cNvPr id="9" name="Textfeld 8"/>
+          <p:cNvSpPr txBox="1"/>
+          <p:nvPr/>
+        </p:nvSpPr>
+        <p:spPr>
+          <a:xfrm>
+            <a:off x="2051720" y="1627783"/>
+            <a:ext cx="1800200" cy="577081"/>
+          </a:xfrm>
+          <a:prstGeom prst="rect">
+            <a:avLst/>
+          </a:prstGeom>
+          <a:solidFill>
+            <a:schemeClr val="accent6">
+              <a:lumMod val="20000"/>
+              <a:lumOff val="80000"/>
+              <a:alpha val="76000"/>
+            </a:schemeClr>
+          </a:solidFill>
+        </p:spPr>
+        <p:txBody>
+          <a:bodyPr wrap="square" rtlCol="0">
+            <a:spAutoFit/>
+          </a:bodyPr>
+          <a:lstStyle/>
+          <a:p>
+            <a:r>
+              <a:rPr lang="en-US" sz="1050" b="1" dirty="0" smtClean="0">
+                <a:solidFill>
+                  <a:srgbClr val="C00000"/>
+                </a:solidFill>
+              </a:rPr>
+              <a:t>Switch between textual and diagrammatic notations for the architecture</a:t>
+            </a:r>
+            <a:endParaRPr lang="en-US" sz="1050" b="1" dirty="0" smtClean="0">
+              <a:solidFill>
+                <a:srgbClr val="C00000"/>
+              </a:solidFill>
+            </a:endParaRPr>
+          </a:p>
+        </p:txBody>
+      </p:sp>
+      <p:cxnSp>
+        <p:nvCxnSpPr>
+          <p:cNvPr id="10" name="Gerade Verbindung mit Pfeil 9"/>
+          <p:cNvCxnSpPr>
+            <a:stCxn id="9" idx="0"/>
+          </p:cNvCxnSpPr>
+          <p:nvPr/>
+        </p:nvCxnSpPr>
+        <p:spPr>
+          <a:xfrm flipH="1" flipV="1">
+            <a:off x="2339752" y="548680"/>
+            <a:ext cx="612068" cy="1079103"/>
+          </a:xfrm>
+          <a:prstGeom prst="straightConnector1">
+            <a:avLst/>
+          </a:prstGeom>
+          <a:ln w="19050">
+            <a:solidFill>
+              <a:srgbClr val="C00000"/>
+            </a:solidFill>
+            <a:tailEnd type="triangle"/>
+          </a:ln>
+        </p:spPr>
+        <p:style>
+          <a:lnRef idx="1">
+            <a:schemeClr val="accent1"/>
+          </a:lnRef>
+          <a:fillRef idx="0">
+            <a:schemeClr val="accent1"/>
+          </a:fillRef>
+          <a:effectRef idx="0">
+            <a:schemeClr val="accent1"/>
+          </a:effectRef>
+          <a:fontRef idx="minor">
+            <a:schemeClr val="tx1"/>
+          </a:fontRef>
+        </p:style>
+      </p:cxnSp>
+      <p:sp>
+        <p:nvSpPr>
+          <p:cNvPr id="19" name="Textfeld 18"/>
+          <p:cNvSpPr txBox="1"/>
+          <p:nvPr/>
+        </p:nvSpPr>
+        <p:spPr>
+          <a:xfrm>
+            <a:off x="1228550" y="3429000"/>
+            <a:ext cx="1111202" cy="253916"/>
+          </a:xfrm>
+          <a:prstGeom prst="rect">
+            <a:avLst/>
+          </a:prstGeom>
+          <a:solidFill>
+            <a:schemeClr val="accent6">
+              <a:lumMod val="20000"/>
+              <a:lumOff val="80000"/>
+              <a:alpha val="76000"/>
+            </a:schemeClr>
+          </a:solidFill>
+        </p:spPr>
+        <p:txBody>
+          <a:bodyPr wrap="none" rtlCol="0">
+            <a:spAutoFit/>
+          </a:bodyPr>
+          <a:lstStyle/>
+          <a:p>
+            <a:r>
+              <a:rPr lang="en-US" sz="1050" b="1" dirty="0" smtClean="0">
+                <a:solidFill>
+                  <a:srgbClr val="C00000"/>
+                </a:solidFill>
+              </a:rPr>
+              <a:t>Textual notation</a:t>
+            </a:r>
+            <a:endParaRPr lang="en-US" sz="1050" b="1" dirty="0" smtClean="0">
+              <a:solidFill>
+                <a:srgbClr val="C00000"/>
+              </a:solidFill>
+            </a:endParaRPr>
+          </a:p>
+        </p:txBody>
+      </p:sp>
+      <p:sp>
+        <p:nvSpPr>
+          <p:cNvPr id="21" name="Textfeld 20"/>
+          <p:cNvSpPr txBox="1"/>
+          <p:nvPr/>
+        </p:nvSpPr>
+        <p:spPr>
+          <a:xfrm>
+            <a:off x="2051720" y="2276872"/>
+            <a:ext cx="1584176" cy="415498"/>
+          </a:xfrm>
+          <a:prstGeom prst="rect">
+            <a:avLst/>
+          </a:prstGeom>
+          <a:solidFill>
+            <a:schemeClr val="accent6">
+              <a:lumMod val="20000"/>
+              <a:lumOff val="80000"/>
+              <a:alpha val="76000"/>
+            </a:schemeClr>
+          </a:solidFill>
+        </p:spPr>
+        <p:txBody>
+          <a:bodyPr wrap="square" rtlCol="0">
+            <a:spAutoFit/>
+          </a:bodyPr>
+          <a:lstStyle/>
+          <a:p>
+            <a:r>
+              <a:rPr lang="en-US" sz="1050" b="1" dirty="0" smtClean="0">
+                <a:solidFill>
+                  <a:srgbClr val="C00000"/>
+                </a:solidFill>
+              </a:rPr>
+              <a:t>Special defines are used to define output ports</a:t>
+            </a:r>
+          </a:p>
+        </p:txBody>
+      </p:sp>
+      <p:cxnSp>
+        <p:nvCxnSpPr>
+          <p:cNvPr id="22" name="Gerade Verbindung mit Pfeil 21"/>
+          <p:cNvCxnSpPr>
+            <a:stCxn id="21" idx="1"/>
+          </p:cNvCxnSpPr>
+          <p:nvPr/>
+        </p:nvCxnSpPr>
+        <p:spPr>
+          <a:xfrm flipH="1" flipV="1">
+            <a:off x="1115616" y="2204864"/>
+            <a:ext cx="936104" cy="279757"/>
+          </a:xfrm>
+          <a:prstGeom prst="straightConnector1">
+            <a:avLst/>
+          </a:prstGeom>
+          <a:ln w="19050">
+            <a:solidFill>
+              <a:srgbClr val="C00000"/>
+            </a:solidFill>
+            <a:tailEnd type="triangle"/>
+          </a:ln>
+        </p:spPr>
+        <p:style>
+          <a:lnRef idx="1">
+            <a:schemeClr val="accent1"/>
+          </a:lnRef>
+          <a:fillRef idx="0">
+            <a:schemeClr val="accent1"/>
+          </a:fillRef>
+          <a:effectRef idx="0">
+            <a:schemeClr val="accent1"/>
+          </a:effectRef>
+          <a:fontRef idx="minor">
+            <a:schemeClr val="tx1"/>
+          </a:fontRef>
+        </p:style>
+      </p:cxnSp>
+      <p:sp>
+        <p:nvSpPr>
+          <p:cNvPr id="27" name="Textfeld 26"/>
+          <p:cNvSpPr txBox="1"/>
+          <p:nvPr/>
+        </p:nvSpPr>
+        <p:spPr>
+          <a:xfrm>
+            <a:off x="5940152" y="3391108"/>
+            <a:ext cx="1558440" cy="253916"/>
+          </a:xfrm>
+          <a:prstGeom prst="rect">
+            <a:avLst/>
+          </a:prstGeom>
+          <a:solidFill>
+            <a:schemeClr val="accent6">
+              <a:lumMod val="20000"/>
+              <a:lumOff val="80000"/>
+              <a:alpha val="76000"/>
+            </a:schemeClr>
+          </a:solidFill>
+        </p:spPr>
+        <p:txBody>
+          <a:bodyPr wrap="none" rtlCol="0">
+            <a:spAutoFit/>
+          </a:bodyPr>
+          <a:lstStyle/>
+          <a:p>
+            <a:r>
+              <a:rPr lang="en-US" sz="1050" b="1" dirty="0" smtClean="0">
+                <a:solidFill>
+                  <a:srgbClr val="C00000"/>
+                </a:solidFill>
+              </a:rPr>
+              <a:t>Generated  NuSMV code</a:t>
+            </a:r>
+            <a:endParaRPr lang="en-US" sz="1050" b="1" dirty="0" smtClean="0">
+              <a:solidFill>
+                <a:srgbClr val="C00000"/>
+              </a:solidFill>
+            </a:endParaRPr>
+          </a:p>
+        </p:txBody>
+      </p:sp>
+      <p:sp>
+        <p:nvSpPr>
+          <p:cNvPr id="28" name="Textfeld 27"/>
+          <p:cNvSpPr txBox="1"/>
+          <p:nvPr/>
+        </p:nvSpPr>
+        <p:spPr>
+          <a:xfrm>
+            <a:off x="7092280" y="2276872"/>
+            <a:ext cx="1800200" cy="415498"/>
+          </a:xfrm>
+          <a:prstGeom prst="rect">
+            <a:avLst/>
+          </a:prstGeom>
+          <a:solidFill>
+            <a:schemeClr val="accent6">
+              <a:lumMod val="20000"/>
+              <a:lumOff val="80000"/>
+              <a:alpha val="76000"/>
+            </a:schemeClr>
+          </a:solidFill>
+        </p:spPr>
+        <p:txBody>
+          <a:bodyPr wrap="square" rtlCol="0">
+            <a:spAutoFit/>
+          </a:bodyPr>
+          <a:lstStyle/>
+          <a:p>
+            <a:r>
+              <a:rPr lang="en-US" sz="1050" b="1" dirty="0" smtClean="0">
+                <a:solidFill>
+                  <a:srgbClr val="C00000"/>
+                </a:solidFill>
+              </a:rPr>
+              <a:t>WIRING sections are generated into VAR sections</a:t>
+            </a:r>
+            <a:endParaRPr lang="en-US" sz="1050" b="1" dirty="0" smtClean="0">
+              <a:solidFill>
+                <a:srgbClr val="C00000"/>
+              </a:solidFill>
+            </a:endParaRPr>
+          </a:p>
+        </p:txBody>
+      </p:sp>
+      <p:sp>
+        <p:nvSpPr>
+          <p:cNvPr id="29" name="Textfeld 28"/>
+          <p:cNvSpPr txBox="1"/>
+          <p:nvPr/>
+        </p:nvSpPr>
+        <p:spPr>
+          <a:xfrm>
+            <a:off x="7164288" y="692696"/>
+            <a:ext cx="1800200" cy="415498"/>
+          </a:xfrm>
+          <a:prstGeom prst="rect">
+            <a:avLst/>
+          </a:prstGeom>
+          <a:solidFill>
+            <a:schemeClr val="accent6">
+              <a:lumMod val="20000"/>
+              <a:lumOff val="80000"/>
+              <a:alpha val="76000"/>
+            </a:schemeClr>
+          </a:solidFill>
+        </p:spPr>
+        <p:txBody>
+          <a:bodyPr wrap="square" rtlCol="0">
+            <a:spAutoFit/>
+          </a:bodyPr>
+          <a:lstStyle/>
+          <a:p>
+            <a:r>
+              <a:rPr lang="en-US" sz="1050" b="1" dirty="0" smtClean="0">
+                <a:solidFill>
+                  <a:srgbClr val="C00000"/>
+                </a:solidFill>
+              </a:rPr>
+              <a:t>‘output’ declarations are generated into defines</a:t>
+            </a:r>
+            <a:endParaRPr lang="en-US" sz="1050" b="1" dirty="0" smtClean="0">
+              <a:solidFill>
+                <a:srgbClr val="C00000"/>
+              </a:solidFill>
+            </a:endParaRPr>
+          </a:p>
+        </p:txBody>
+      </p:sp>
+    </p:spTree>
+  </p:cSld>
+  <p:clrMapOvr>
+    <a:masterClrMapping/>
+  </p:clrMapOvr>
+</p:sld>
+</file>
+
+<file path=ppt/slides/slide4.xml><?xml version="1.0" encoding="utf-8"?>
+<p:sld xmlns:a="http://schemas.openxmlformats.org/drawingml/2006/main" xmlns:r="http://schemas.openxmlformats.org/officeDocument/2006/relationships" xmlns:p="http://schemas.openxmlformats.org/presentationml/2006/main">
+  <p:cSld>
+    <p:spTree>
+      <p:nvGrpSpPr>
+        <p:cNvPr id="1" name=""/>
+        <p:cNvGrpSpPr/>
+        <p:nvPr/>
+      </p:nvGrpSpPr>
+      <p:grpSpPr>
+        <a:xfrm>
+          <a:off x="0" y="0"/>
+          <a:ext cx="0" cy="0"/>
+          <a:chOff x="0" y="0"/>
+          <a:chExt cx="0" cy="0"/>
+        </a:xfrm>
+      </p:grpSpPr>
+      <p:pic>
+        <p:nvPicPr>
+          <p:cNvPr id="4100" name="Picture 4"/>
+          <p:cNvPicPr>
+            <a:picLocks noChangeAspect="1" noChangeArrowheads="1"/>
+          </p:cNvPicPr>
+          <p:nvPr/>
+        </p:nvPicPr>
+        <p:blipFill>
+          <a:blip r:embed="rId2" cstate="print"/>
+          <a:srcRect/>
+          <a:stretch>
+            <a:fillRect/>
+          </a:stretch>
+        </p:blipFill>
+        <p:spPr bwMode="auto">
+          <a:xfrm>
+            <a:off x="1115616" y="116632"/>
+            <a:ext cx="7344816" cy="5113042"/>
+          </a:xfrm>
+          <a:prstGeom prst="rect">
+            <a:avLst/>
+          </a:prstGeom>
+          <a:noFill/>
+          <a:ln w="9525">
+            <a:noFill/>
+            <a:miter lim="800000"/>
+            <a:headEnd/>
+            <a:tailEnd/>
+          </a:ln>
+        </p:spPr>
+      </p:pic>
+      <p:sp>
+        <p:nvSpPr>
+          <p:cNvPr id="20" name="Textfeld 19"/>
+          <p:cNvSpPr txBox="1"/>
+          <p:nvPr/>
+        </p:nvSpPr>
+        <p:spPr>
+          <a:xfrm>
+            <a:off x="3059832" y="4437112"/>
+            <a:ext cx="1478290" cy="253916"/>
+          </a:xfrm>
+          <a:prstGeom prst="rect">
+            <a:avLst/>
+          </a:prstGeom>
+          <a:solidFill>
+            <a:schemeClr val="accent6">
+              <a:lumMod val="20000"/>
+              <a:lumOff val="80000"/>
+              <a:alpha val="76000"/>
+            </a:schemeClr>
+          </a:solidFill>
+        </p:spPr>
+        <p:txBody>
+          <a:bodyPr wrap="none" rtlCol="0">
+            <a:spAutoFit/>
+          </a:bodyPr>
+          <a:lstStyle/>
+          <a:p>
+            <a:r>
+              <a:rPr lang="en-US" sz="1050" b="1" dirty="0" smtClean="0">
+                <a:solidFill>
+                  <a:srgbClr val="C00000"/>
+                </a:solidFill>
+              </a:rPr>
+              <a:t>Diagrammatic notation</a:t>
+            </a:r>
+            <a:endParaRPr lang="en-US" sz="1050" b="1" dirty="0" smtClean="0">
+              <a:solidFill>
+                <a:srgbClr val="C00000"/>
+              </a:solidFill>
+            </a:endParaRPr>
+          </a:p>
+        </p:txBody>
+      </p:sp>
+      <p:sp>
+        <p:nvSpPr>
+          <p:cNvPr id="30" name="Textfeld 29"/>
+          <p:cNvSpPr txBox="1"/>
+          <p:nvPr/>
+        </p:nvSpPr>
+        <p:spPr>
+          <a:xfrm>
+            <a:off x="6372200" y="2780928"/>
+            <a:ext cx="1806905" cy="577081"/>
+          </a:xfrm>
+          <a:prstGeom prst="rect">
+            <a:avLst/>
+          </a:prstGeom>
+          <a:solidFill>
+            <a:schemeClr val="accent6">
+              <a:lumMod val="20000"/>
+              <a:lumOff val="80000"/>
+              <a:alpha val="76000"/>
+            </a:schemeClr>
+          </a:solidFill>
+        </p:spPr>
+        <p:txBody>
+          <a:bodyPr wrap="none" rtlCol="0">
+            <a:spAutoFit/>
+          </a:bodyPr>
+          <a:lstStyle/>
+          <a:p>
+            <a:r>
+              <a:rPr lang="en-US" sz="1050" b="1" dirty="0" smtClean="0">
+                <a:solidFill>
+                  <a:srgbClr val="C00000"/>
+                </a:solidFill>
+              </a:rPr>
+              <a:t>Diagram palette can be used </a:t>
+            </a:r>
+          </a:p>
+          <a:p>
+            <a:r>
+              <a:rPr lang="en-US" sz="1050" b="1" dirty="0" smtClean="0">
+                <a:solidFill>
+                  <a:srgbClr val="C00000"/>
+                </a:solidFill>
+              </a:rPr>
+              <a:t>to create architectures via </a:t>
+            </a:r>
+          </a:p>
+          <a:p>
+            <a:r>
+              <a:rPr lang="en-US" sz="1050" b="1" dirty="0" smtClean="0">
+                <a:solidFill>
+                  <a:srgbClr val="C00000"/>
+                </a:solidFill>
+              </a:rPr>
+              <a:t>drag-and-drop</a:t>
             </a:r>
             <a:endParaRPr lang="en-US" sz="1050" b="1" dirty="0" smtClean="0">
               <a:solidFill>

</xml_diff>